<commit_message>
added template and changed color schemes, and added va for lover logo
</commit_message>
<xml_diff>
--- a/posters/AI.pptx
+++ b/posters/AI.pptx
@@ -208,7 +208,7 @@
           <a:p>
             <a:fld id="{D77D1E1A-4DEA-CC41-98E6-C47FA7D3BEBB}" type="datetimeFigureOut">
               <a:rPr lang="en-US" smtClean="0"/>
-              <a:t>4/25/24</a:t>
+              <a:t>5/21/24</a:t>
             </a:fld>
             <a:endParaRPr lang="en-US"/>
           </a:p>
@@ -739,7 +739,7 @@
             <a:fld id="{1D8BD707-D9CF-40AE-B4C6-C98DA3205C09}" type="datetimeFigureOut">
               <a:rPr lang="en-US" smtClean="0"/>
               <a:pPr/>
-              <a:t>4/25/24</a:t>
+              <a:t>5/21/24</a:t>
             </a:fld>
             <a:endParaRPr lang="en-US"/>
           </a:p>
@@ -904,7 +904,7 @@
             <a:fld id="{1D8BD707-D9CF-40AE-B4C6-C98DA3205C09}" type="datetimeFigureOut">
               <a:rPr lang="en-US" smtClean="0"/>
               <a:pPr/>
-              <a:t>4/25/24</a:t>
+              <a:t>5/21/24</a:t>
             </a:fld>
             <a:endParaRPr lang="en-US"/>
           </a:p>
@@ -1079,7 +1079,7 @@
             <a:fld id="{1D8BD707-D9CF-40AE-B4C6-C98DA3205C09}" type="datetimeFigureOut">
               <a:rPr lang="en-US" smtClean="0"/>
               <a:pPr/>
-              <a:t>4/25/24</a:t>
+              <a:t>5/21/24</a:t>
             </a:fld>
             <a:endParaRPr lang="en-US"/>
           </a:p>
@@ -1244,7 +1244,7 @@
             <a:fld id="{1D8BD707-D9CF-40AE-B4C6-C98DA3205C09}" type="datetimeFigureOut">
               <a:rPr lang="en-US" smtClean="0"/>
               <a:pPr/>
-              <a:t>4/25/24</a:t>
+              <a:t>5/21/24</a:t>
             </a:fld>
             <a:endParaRPr lang="en-US"/>
           </a:p>
@@ -1486,7 +1486,7 @@
             <a:fld id="{1D8BD707-D9CF-40AE-B4C6-C98DA3205C09}" type="datetimeFigureOut">
               <a:rPr lang="en-US" smtClean="0"/>
               <a:pPr/>
-              <a:t>4/25/24</a:t>
+              <a:t>5/21/24</a:t>
             </a:fld>
             <a:endParaRPr lang="en-US"/>
           </a:p>
@@ -1768,7 +1768,7 @@
             <a:fld id="{1D8BD707-D9CF-40AE-B4C6-C98DA3205C09}" type="datetimeFigureOut">
               <a:rPr lang="en-US" smtClean="0"/>
               <a:pPr/>
-              <a:t>4/25/24</a:t>
+              <a:t>5/21/24</a:t>
             </a:fld>
             <a:endParaRPr lang="en-US"/>
           </a:p>
@@ -2184,7 +2184,7 @@
             <a:fld id="{1D8BD707-D9CF-40AE-B4C6-C98DA3205C09}" type="datetimeFigureOut">
               <a:rPr lang="en-US" smtClean="0"/>
               <a:pPr/>
-              <a:t>4/25/24</a:t>
+              <a:t>5/21/24</a:t>
             </a:fld>
             <a:endParaRPr lang="en-US"/>
           </a:p>
@@ -2298,7 +2298,7 @@
             <a:fld id="{1D8BD707-D9CF-40AE-B4C6-C98DA3205C09}" type="datetimeFigureOut">
               <a:rPr lang="en-US" smtClean="0"/>
               <a:pPr/>
-              <a:t>4/25/24</a:t>
+              <a:t>5/21/24</a:t>
             </a:fld>
             <a:endParaRPr lang="en-US"/>
           </a:p>
@@ -2390,7 +2390,7 @@
             <a:fld id="{1D8BD707-D9CF-40AE-B4C6-C98DA3205C09}" type="datetimeFigureOut">
               <a:rPr lang="en-US" smtClean="0"/>
               <a:pPr/>
-              <a:t>4/25/24</a:t>
+              <a:t>5/21/24</a:t>
             </a:fld>
             <a:endParaRPr lang="en-US"/>
           </a:p>
@@ -2662,7 +2662,7 @@
             <a:fld id="{1D8BD707-D9CF-40AE-B4C6-C98DA3205C09}" type="datetimeFigureOut">
               <a:rPr lang="en-US" smtClean="0"/>
               <a:pPr/>
-              <a:t>4/25/24</a:t>
+              <a:t>5/21/24</a:t>
             </a:fld>
             <a:endParaRPr lang="en-US"/>
           </a:p>
@@ -2911,7 +2911,7 @@
             <a:fld id="{1D8BD707-D9CF-40AE-B4C6-C98DA3205C09}" type="datetimeFigureOut">
               <a:rPr lang="en-US" smtClean="0"/>
               <a:pPr/>
-              <a:t>4/25/24</a:t>
+              <a:t>5/21/24</a:t>
             </a:fld>
             <a:endParaRPr lang="en-US"/>
           </a:p>
@@ -3119,7 +3119,7 @@
             <a:fld id="{1D8BD707-D9CF-40AE-B4C6-C98DA3205C09}" type="datetimeFigureOut">
               <a:rPr lang="en-US" smtClean="0"/>
               <a:pPr/>
-              <a:t>4/25/24</a:t>
+              <a:t>5/21/24</a:t>
             </a:fld>
             <a:endParaRPr lang="en-US"/>
           </a:p>
@@ -3554,34 +3554,7 @@
               </a:path>
             </a:pathLst>
           </a:custGeom>
-          <a:gradFill flip="none" rotWithShape="1">
-            <a:gsLst>
-              <a:gs pos="0">
-                <a:schemeClr val="accent1">
-                  <a:lumMod val="89000"/>
-                </a:schemeClr>
-              </a:gs>
-              <a:gs pos="23000">
-                <a:schemeClr val="accent1">
-                  <a:lumMod val="89000"/>
-                </a:schemeClr>
-              </a:gs>
-              <a:gs pos="69000">
-                <a:schemeClr val="accent1">
-                  <a:lumMod val="75000"/>
-                </a:schemeClr>
-              </a:gs>
-              <a:gs pos="97000">
-                <a:schemeClr val="accent1">
-                  <a:lumMod val="70000"/>
-                </a:schemeClr>
-              </a:gs>
-            </a:gsLst>
-            <a:path path="circle">
-              <a:fillToRect l="50000" t="50000" r="50000" b="50000"/>
-            </a:path>
-            <a:tileRect/>
-          </a:gradFill>
+          <a:noFill/>
           <a:ln w="12700">
             <a:solidFill>
               <a:srgbClr val="000000">
@@ -3627,7 +3600,7 @@
         </p:nvSpPr>
         <p:spPr>
           <a:xfrm>
-            <a:off x="6039188" y="850573"/>
+            <a:off x="8401270" y="1276792"/>
             <a:ext cx="18043525" cy="2233240"/>
           </a:xfrm>
           <a:prstGeom prst="rect">
@@ -3653,9 +3626,6 @@
             </a:pPr>
             <a:r>
               <a:rPr lang="en-US" altLang="zh-CN" sz="8800" b="1" dirty="0">
-                <a:solidFill>
-                  <a:srgbClr val="FFFFFF"/>
-                </a:solidFill>
                 <a:latin typeface="Avenir" panose="02000503020000020003" pitchFamily="2" charset="0"/>
                 <a:cs typeface="Calibri" panose="020F0502020204030204" pitchFamily="34" charset="0"/>
               </a:rPr>
@@ -3682,9 +3652,6 @@
             </a:r>
             <a:r>
               <a:rPr lang="en-US" altLang="zh-CN" sz="4000" b="1" dirty="0">
-                <a:solidFill>
-                  <a:schemeClr val="bg1"/>
-                </a:solidFill>
                 <a:latin typeface="Avenir" panose="02000503020000020003" pitchFamily="2" charset="0"/>
                 <a:cs typeface="Calibri" panose="020F0502020204030204" pitchFamily="34" charset="0"/>
               </a:rPr>
@@ -3692,9 +3659,6 @@
             </a:r>
             <a:r>
               <a:rPr lang="en-US" altLang="zh-CN" sz="4000" dirty="0">
-                <a:solidFill>
-                  <a:schemeClr val="bg1"/>
-                </a:solidFill>
                 <a:latin typeface="Avenir" panose="02000503020000020003" pitchFamily="2" charset="0"/>
                 <a:cs typeface="Calibri" panose="020F0502020204030204" pitchFamily="34" charset="0"/>
               </a:rPr>
@@ -3702,9 +3666,6 @@
             </a:r>
             <a:r>
               <a:rPr lang="en-US" altLang="zh-CN" sz="4000" b="1" dirty="0">
-                <a:solidFill>
-                  <a:schemeClr val="bg1"/>
-                </a:solidFill>
                 <a:latin typeface="Avenir" panose="02000503020000020003" pitchFamily="2" charset="0"/>
                 <a:cs typeface="Calibri" panose="020F0502020204030204" pitchFamily="34" charset="0"/>
               </a:rPr>
@@ -3712,9 +3673,6 @@
             </a:r>
             <a:r>
               <a:rPr lang="en-US" altLang="zh-CN" sz="4000" dirty="0">
-                <a:solidFill>
-                  <a:schemeClr val="bg1"/>
-                </a:solidFill>
                 <a:latin typeface="Avenir" panose="02000503020000020003" pitchFamily="2" charset="0"/>
                 <a:cs typeface="Calibri" panose="020F0502020204030204" pitchFamily="34" charset="0"/>
               </a:rPr>
@@ -3722,9 +3680,6 @@
             </a:r>
             <a:r>
               <a:rPr lang="en-US" altLang="zh-CN" sz="4000" b="1" dirty="0">
-                <a:solidFill>
-                  <a:schemeClr val="bg1"/>
-                </a:solidFill>
                 <a:latin typeface="Avenir" panose="02000503020000020003" pitchFamily="2" charset="0"/>
                 <a:cs typeface="Calibri" panose="020F0502020204030204" pitchFamily="34" charset="0"/>
               </a:rPr>
@@ -3732,9 +3687,6 @@
             </a:r>
             <a:r>
               <a:rPr lang="en-US" altLang="zh-CN" sz="4000" dirty="0">
-                <a:solidFill>
-                  <a:schemeClr val="bg1"/>
-                </a:solidFill>
                 <a:latin typeface="Avenir" panose="02000503020000020003" pitchFamily="2" charset="0"/>
                 <a:cs typeface="Calibri" panose="020F0502020204030204" pitchFamily="34" charset="0"/>
               </a:rPr>
@@ -3742,9 +3694,6 @@
             </a:r>
             <a:r>
               <a:rPr lang="en-US" altLang="zh-CN" sz="4000" b="1" dirty="0">
-                <a:solidFill>
-                  <a:srgbClr val="FFFFFF"/>
-                </a:solidFill>
                 <a:latin typeface="Avenir" panose="02000503020000020003" pitchFamily="2" charset="0"/>
                 <a:cs typeface="Calibri" panose="020F0502020204030204" pitchFamily="34" charset="0"/>
               </a:rPr>
@@ -3759,9 +3708,6 @@
             </a:r>
             <a:r>
               <a:rPr lang="en-US" altLang="zh-CN" sz="4000" b="1" dirty="0">
-                <a:solidFill>
-                  <a:srgbClr val="FFFFFF"/>
-                </a:solidFill>
                 <a:latin typeface="Avenir" panose="02000503020000020003" pitchFamily="2" charset="0"/>
                 <a:cs typeface="Calibri" panose="020F0502020204030204" pitchFamily="34" charset="0"/>
               </a:rPr>
@@ -3770,87 +3716,6 @@
           </a:p>
         </p:txBody>
       </p:sp>
-      <p:grpSp>
-        <p:nvGrpSpPr>
-          <p:cNvPr id="26" name="Group 25">
-            <a:extLst>
-              <a:ext uri="{FF2B5EF4-FFF2-40B4-BE49-F238E27FC236}">
-                <a16:creationId xmlns:a16="http://schemas.microsoft.com/office/drawing/2014/main" id="{F8DE6B88-15D8-BF49-A4B0-2DD0FCB567FC}"/>
-              </a:ext>
-            </a:extLst>
-          </p:cNvPr>
-          <p:cNvGrpSpPr/>
-          <p:nvPr/>
-        </p:nvGrpSpPr>
-        <p:grpSpPr>
-          <a:xfrm>
-            <a:off x="425450" y="316736"/>
-            <a:ext cx="4343401" cy="3578267"/>
-            <a:chOff x="196851" y="57676"/>
-            <a:chExt cx="4343401" cy="3578267"/>
-          </a:xfrm>
-        </p:grpSpPr>
-        <p:pic>
-          <p:nvPicPr>
-            <p:cNvPr id="21" name="Picture 3"/>
-            <p:cNvPicPr>
-              <a:picLocks noChangeAspect="1" noChangeArrowheads="1"/>
-            </p:cNvPicPr>
-            <p:nvPr/>
-          </p:nvPicPr>
-          <p:blipFill rotWithShape="1">
-            <a:blip r:embed="rId3"/>
-            <a:srcRect l="1342" t="2985" r="1115" b="3989"/>
-            <a:stretch/>
-          </p:blipFill>
-          <p:spPr bwMode="auto">
-            <a:xfrm>
-              <a:off x="196852" y="2349500"/>
-              <a:ext cx="4343400" cy="1286443"/>
-            </a:xfrm>
-            <a:prstGeom prst="rect">
-              <a:avLst/>
-            </a:prstGeom>
-            <a:noFill/>
-          </p:spPr>
-        </p:pic>
-        <p:pic>
-          <p:nvPicPr>
-            <p:cNvPr id="25" name="Picture 24">
-              <a:extLst>
-                <a:ext uri="{FF2B5EF4-FFF2-40B4-BE49-F238E27FC236}">
-                  <a16:creationId xmlns:a16="http://schemas.microsoft.com/office/drawing/2014/main" id="{2121CF55-4DE4-FA4D-B4C9-81D74DF3E5A4}"/>
-                </a:ext>
-              </a:extLst>
-            </p:cNvPr>
-            <p:cNvPicPr>
-              <a:picLocks noChangeAspect="1"/>
-            </p:cNvPicPr>
-            <p:nvPr/>
-          </p:nvPicPr>
-          <p:blipFill>
-            <a:blip r:embed="rId4">
-              <a:extLst>
-                <a:ext uri="{28A0092B-C50C-407E-A947-70E740481C1C}">
-                  <a14:useLocalDpi xmlns:a14="http://schemas.microsoft.com/office/drawing/2010/main" val="0"/>
-                </a:ext>
-              </a:extLst>
-            </a:blip>
-            <a:stretch>
-              <a:fillRect/>
-            </a:stretch>
-          </p:blipFill>
-          <p:spPr>
-            <a:xfrm>
-              <a:off x="196851" y="57676"/>
-              <a:ext cx="4343400" cy="2322730"/>
-            </a:xfrm>
-            <a:prstGeom prst="rect">
-              <a:avLst/>
-            </a:prstGeom>
-          </p:spPr>
-        </p:pic>
-      </p:grpSp>
       <p:grpSp>
         <p:nvGrpSpPr>
           <p:cNvPr id="40" name="Group 39">
@@ -3938,29 +3803,24 @@
             <a:gradFill flip="none" rotWithShape="1">
               <a:gsLst>
                 <a:gs pos="0">
-                  <a:schemeClr val="accent1">
-                    <a:lumMod val="89000"/>
+                  <a:schemeClr val="accent2">
+                    <a:lumMod val="67000"/>
                   </a:schemeClr>
                 </a:gs>
-                <a:gs pos="23000">
-                  <a:schemeClr val="accent1">
-                    <a:lumMod val="89000"/>
+                <a:gs pos="48000">
+                  <a:schemeClr val="accent2">
+                    <a:lumMod val="97000"/>
+                    <a:lumOff val="3000"/>
                   </a:schemeClr>
                 </a:gs>
-                <a:gs pos="69000">
-                  <a:schemeClr val="accent1">
-                    <a:lumMod val="75000"/>
-                  </a:schemeClr>
-                </a:gs>
-                <a:gs pos="97000">
-                  <a:schemeClr val="accent1">
-                    <a:lumMod val="70000"/>
+                <a:gs pos="100000">
+                  <a:schemeClr val="accent2">
+                    <a:lumMod val="60000"/>
+                    <a:lumOff val="40000"/>
                   </a:schemeClr>
                 </a:gs>
               </a:gsLst>
-              <a:path path="circle">
-                <a:fillToRect l="50000" t="50000" r="50000" b="50000"/>
-              </a:path>
+              <a:lin ang="10800000" scaled="0"/>
               <a:tileRect/>
             </a:gradFill>
             <a:ln w="12700">
@@ -4083,10 +3943,10 @@
         </p:nvGrpSpPr>
         <p:grpSpPr>
           <a:xfrm>
-            <a:off x="14548300" y="4345247"/>
-            <a:ext cx="15584779" cy="15878454"/>
-            <a:chOff x="273050" y="4880131"/>
-            <a:chExt cx="9317958" cy="15878454"/>
+            <a:off x="14522285" y="4347384"/>
+            <a:ext cx="15584779" cy="15898415"/>
+            <a:chOff x="273050" y="4575338"/>
+            <a:chExt cx="9317958" cy="16183247"/>
           </a:xfrm>
         </p:grpSpPr>
         <p:sp>
@@ -4103,8 +3963,8 @@
           </p:nvSpPr>
           <p:spPr>
             <a:xfrm>
-              <a:off x="273050" y="4880131"/>
-              <a:ext cx="9317958" cy="629996"/>
+              <a:off x="273050" y="4575338"/>
+              <a:ext cx="9317958" cy="856713"/>
             </a:xfrm>
             <a:custGeom>
               <a:avLst/>
@@ -4162,29 +4022,24 @@
             <a:gradFill flip="none" rotWithShape="1">
               <a:gsLst>
                 <a:gs pos="0">
-                  <a:schemeClr val="accent1">
-                    <a:lumMod val="89000"/>
+                  <a:schemeClr val="accent2">
+                    <a:lumMod val="67000"/>
                   </a:schemeClr>
                 </a:gs>
-                <a:gs pos="23000">
-                  <a:schemeClr val="accent1">
-                    <a:lumMod val="89000"/>
+                <a:gs pos="48000">
+                  <a:schemeClr val="accent2">
+                    <a:lumMod val="97000"/>
+                    <a:lumOff val="3000"/>
                   </a:schemeClr>
                 </a:gs>
-                <a:gs pos="69000">
-                  <a:schemeClr val="accent1">
-                    <a:lumMod val="75000"/>
-                  </a:schemeClr>
-                </a:gs>
-                <a:gs pos="97000">
-                  <a:schemeClr val="accent1">
-                    <a:lumMod val="70000"/>
+                <a:gs pos="100000">
+                  <a:schemeClr val="accent2">
+                    <a:lumMod val="60000"/>
+                    <a:lumOff val="40000"/>
                   </a:schemeClr>
                 </a:gs>
               </a:gsLst>
-              <a:path path="circle">
-                <a:fillToRect l="50000" t="50000" r="50000" b="50000"/>
-              </a:path>
+              <a:lin ang="10800000" scaled="0"/>
               <a:tileRect/>
             </a:gradFill>
             <a:ln w="12700">
@@ -4298,8 +4153,8 @@
         </p:nvSpPr>
         <p:spPr>
           <a:xfrm>
-            <a:off x="23209250" y="39611300"/>
-            <a:ext cx="6532075" cy="601732"/>
+            <a:off x="23207625" y="39660450"/>
+            <a:ext cx="6532075" cy="742978"/>
           </a:xfrm>
           <a:custGeom>
             <a:avLst/>
@@ -4357,29 +4212,24 @@
           <a:gradFill flip="none" rotWithShape="1">
             <a:gsLst>
               <a:gs pos="0">
-                <a:schemeClr val="accent1">
-                  <a:lumMod val="89000"/>
+                <a:schemeClr val="accent2">
+                  <a:lumMod val="67000"/>
                 </a:schemeClr>
               </a:gs>
-              <a:gs pos="23000">
-                <a:schemeClr val="accent1">
-                  <a:lumMod val="89000"/>
+              <a:gs pos="48000">
+                <a:schemeClr val="accent2">
+                  <a:lumMod val="97000"/>
+                  <a:lumOff val="3000"/>
                 </a:schemeClr>
               </a:gs>
-              <a:gs pos="69000">
-                <a:schemeClr val="accent1">
-                  <a:lumMod val="75000"/>
-                </a:schemeClr>
-              </a:gs>
-              <a:gs pos="97000">
-                <a:schemeClr val="accent1">
-                  <a:lumMod val="70000"/>
+              <a:gs pos="100000">
+                <a:schemeClr val="accent2">
+                  <a:lumMod val="60000"/>
+                  <a:lumOff val="40000"/>
                 </a:schemeClr>
               </a:gs>
             </a:gsLst>
-            <a:path path="circle">
-              <a:fillToRect l="50000" t="50000" r="50000" b="50000"/>
-            </a:path>
+            <a:lin ang="10800000" scaled="0"/>
             <a:tileRect/>
           </a:gradFill>
           <a:ln w="12700">
@@ -4411,7 +4261,7 @@
           <a:bodyPr rtlCol="0" anchor="ctr"/>
           <a:lstStyle/>
           <a:p>
-            <a:pPr algn="just"/>
+            <a:pPr algn="ctr"/>
             <a:r>
               <a:rPr lang="en-US" altLang="zh-CN" sz="3600" b="1" dirty="0">
                 <a:latin typeface="Avenir" panose="02000503020000020003" pitchFamily="2" charset="0"/>
@@ -4440,7 +4290,7 @@
         </p:nvSpPr>
         <p:spPr>
           <a:xfrm>
-            <a:off x="23209250" y="40315126"/>
+            <a:off x="23206191" y="40547823"/>
             <a:ext cx="6532075" cy="1966151"/>
           </a:xfrm>
           <a:prstGeom prst="rect">
@@ -4542,10 +4392,10 @@
         </p:nvGrpSpPr>
         <p:grpSpPr>
           <a:xfrm>
-            <a:off x="171000" y="20588617"/>
-            <a:ext cx="24696116" cy="10945483"/>
-            <a:chOff x="273050" y="4880131"/>
-            <a:chExt cx="32027549" cy="10945483"/>
+            <a:off x="171000" y="20400348"/>
+            <a:ext cx="24696116" cy="11133752"/>
+            <a:chOff x="273050" y="4691862"/>
+            <a:chExt cx="32027549" cy="11133752"/>
           </a:xfrm>
         </p:grpSpPr>
         <p:sp>
@@ -4562,8 +4412,8 @@
           </p:nvSpPr>
           <p:spPr>
             <a:xfrm>
-              <a:off x="273050" y="4880131"/>
-              <a:ext cx="32027549" cy="629996"/>
+              <a:off x="273050" y="4691862"/>
+              <a:ext cx="32027549" cy="818265"/>
             </a:xfrm>
             <a:custGeom>
               <a:avLst/>
@@ -4621,29 +4471,24 @@
             <a:gradFill flip="none" rotWithShape="1">
               <a:gsLst>
                 <a:gs pos="0">
-                  <a:schemeClr val="accent1">
-                    <a:lumMod val="89000"/>
+                  <a:schemeClr val="accent2">
+                    <a:lumMod val="67000"/>
                   </a:schemeClr>
                 </a:gs>
-                <a:gs pos="23000">
-                  <a:schemeClr val="accent1">
-                    <a:lumMod val="89000"/>
+                <a:gs pos="48000">
+                  <a:schemeClr val="accent2">
+                    <a:lumMod val="97000"/>
+                    <a:lumOff val="3000"/>
                   </a:schemeClr>
                 </a:gs>
-                <a:gs pos="69000">
-                  <a:schemeClr val="accent1">
-                    <a:lumMod val="75000"/>
-                  </a:schemeClr>
-                </a:gs>
-                <a:gs pos="97000">
-                  <a:schemeClr val="accent1">
-                    <a:lumMod val="70000"/>
+                <a:gs pos="100000">
+                  <a:schemeClr val="accent2">
+                    <a:lumMod val="60000"/>
+                    <a:lumOff val="40000"/>
                   </a:schemeClr>
                 </a:gs>
               </a:gsLst>
-              <a:path path="circle">
-                <a:fillToRect l="50000" t="50000" r="50000" b="50000"/>
-              </a:path>
+              <a:lin ang="10800000" scaled="0"/>
               <a:tileRect/>
             </a:gradFill>
             <a:ln w="12700">
@@ -4766,10 +4611,10 @@
         </p:nvGrpSpPr>
         <p:grpSpPr>
           <a:xfrm>
-            <a:off x="25190450" y="20588617"/>
-            <a:ext cx="4972386" cy="10945483"/>
-            <a:chOff x="273050" y="4880131"/>
-            <a:chExt cx="9317958" cy="10962695"/>
+            <a:off x="25190450" y="20399358"/>
+            <a:ext cx="4972386" cy="11134741"/>
+            <a:chOff x="273050" y="4690575"/>
+            <a:chExt cx="9317958" cy="11152251"/>
           </a:xfrm>
         </p:grpSpPr>
         <p:sp>
@@ -4786,8 +4631,8 @@
           </p:nvSpPr>
           <p:spPr>
             <a:xfrm>
-              <a:off x="273050" y="4880131"/>
-              <a:ext cx="9317958" cy="629996"/>
+              <a:off x="273050" y="4690575"/>
+              <a:ext cx="9317958" cy="819552"/>
             </a:xfrm>
             <a:custGeom>
               <a:avLst/>
@@ -4845,29 +4690,24 @@
             <a:gradFill flip="none" rotWithShape="1">
               <a:gsLst>
                 <a:gs pos="0">
-                  <a:schemeClr val="accent1">
-                    <a:lumMod val="89000"/>
+                  <a:schemeClr val="accent2">
+                    <a:lumMod val="67000"/>
                   </a:schemeClr>
                 </a:gs>
-                <a:gs pos="23000">
-                  <a:schemeClr val="accent1">
-                    <a:lumMod val="89000"/>
+                <a:gs pos="48000">
+                  <a:schemeClr val="accent2">
+                    <a:lumMod val="97000"/>
+                    <a:lumOff val="3000"/>
                   </a:schemeClr>
                 </a:gs>
-                <a:gs pos="69000">
-                  <a:schemeClr val="accent1">
-                    <a:lumMod val="75000"/>
-                  </a:schemeClr>
-                </a:gs>
-                <a:gs pos="97000">
-                  <a:schemeClr val="accent1">
-                    <a:lumMod val="70000"/>
+                <a:gs pos="100000">
+                  <a:schemeClr val="accent2">
+                    <a:lumMod val="60000"/>
+                    <a:lumOff val="40000"/>
                   </a:schemeClr>
                 </a:gs>
               </a:gsLst>
-              <a:path path="circle">
-                <a:fillToRect l="50000" t="50000" r="50000" b="50000"/>
-              </a:path>
+              <a:lin ang="10800000" scaled="0"/>
               <a:tileRect/>
             </a:gradFill>
             <a:ln w="12700">
@@ -5180,8 +5020,8 @@
           </a:p>
         </p:txBody>
       </p:sp>
-      <mc:AlternateContent xmlns:mc="http://schemas.openxmlformats.org/markup-compatibility/2006">
-        <mc:Choice xmlns:a14="http://schemas.microsoft.com/office/drawing/2010/main" Requires="a14">
+      <mc:AlternateContent xmlns:mc="http://schemas.openxmlformats.org/markup-compatibility/2006" xmlns:a14="http://schemas.microsoft.com/office/drawing/2010/main">
+        <mc:Choice Requires="a14">
           <p:sp>
             <p:nvSpPr>
               <p:cNvPr id="120" name="TextBox 119">
@@ -5421,7 +5261,7 @@
             </p:txBody>
           </p:sp>
         </mc:Choice>
-        <mc:Fallback>
+        <mc:Fallback xmlns="">
           <p:sp>
             <p:nvSpPr>
               <p:cNvPr id="120" name="TextBox 119">
@@ -5719,8 +5559,8 @@
           </a:p>
         </p:txBody>
       </p:sp>
-      <mc:AlternateContent xmlns:mc="http://schemas.openxmlformats.org/markup-compatibility/2006">
-        <mc:Choice xmlns:a14="http://schemas.microsoft.com/office/drawing/2010/main" Requires="a14">
+      <mc:AlternateContent xmlns:mc="http://schemas.openxmlformats.org/markup-compatibility/2006" xmlns:a14="http://schemas.microsoft.com/office/drawing/2010/main">
+        <mc:Choice Requires="a14">
           <p:sp>
             <p:nvSpPr>
               <p:cNvPr id="101" name="TextBox 100">
@@ -5864,7 +5704,7 @@
             </p:txBody>
           </p:sp>
         </mc:Choice>
-        <mc:Fallback>
+        <mc:Fallback xmlns="">
           <p:sp>
             <p:nvSpPr>
               <p:cNvPr id="101" name="TextBox 100">
@@ -6885,7 +6725,7 @@
           <p:spPr>
             <a:xfrm>
               <a:off x="273050" y="4880131"/>
-              <a:ext cx="32027549" cy="629996"/>
+              <a:ext cx="32027549" cy="727980"/>
             </a:xfrm>
             <a:custGeom>
               <a:avLst/>
@@ -6943,29 +6783,24 @@
             <a:gradFill flip="none" rotWithShape="1">
               <a:gsLst>
                 <a:gs pos="0">
-                  <a:schemeClr val="accent1">
-                    <a:lumMod val="89000"/>
+                  <a:schemeClr val="accent2">
+                    <a:lumMod val="67000"/>
                   </a:schemeClr>
                 </a:gs>
-                <a:gs pos="23000">
-                  <a:schemeClr val="accent1">
-                    <a:lumMod val="89000"/>
+                <a:gs pos="48000">
+                  <a:schemeClr val="accent2">
+                    <a:lumMod val="97000"/>
+                    <a:lumOff val="3000"/>
                   </a:schemeClr>
                 </a:gs>
-                <a:gs pos="69000">
-                  <a:schemeClr val="accent1">
-                    <a:lumMod val="75000"/>
-                  </a:schemeClr>
-                </a:gs>
-                <a:gs pos="97000">
-                  <a:schemeClr val="accent1">
-                    <a:lumMod val="70000"/>
+                <a:gs pos="100000">
+                  <a:schemeClr val="accent2">
+                    <a:lumMod val="60000"/>
+                    <a:lumOff val="40000"/>
                   </a:schemeClr>
                 </a:gs>
               </a:gsLst>
-              <a:path path="circle">
-                <a:fillToRect l="50000" t="50000" r="50000" b="50000"/>
-              </a:path>
+              <a:lin ang="10800000" scaled="0"/>
               <a:tileRect/>
             </a:gradFill>
             <a:ln w="12700">
@@ -7026,8 +6861,8 @@
           </p:nvSpPr>
           <p:spPr>
             <a:xfrm>
-              <a:off x="273050" y="5626100"/>
-              <a:ext cx="32027549" cy="10199514"/>
+              <a:off x="273050" y="5724955"/>
+              <a:ext cx="32027549" cy="10100659"/>
             </a:xfrm>
             <a:prstGeom prst="rect">
               <a:avLst/>
@@ -7066,7 +6901,7 @@
             <a:lstStyle/>
             <a:p>
               <a:pPr algn="just"/>
-              <a:endParaRPr lang="en-US">
+              <a:endParaRPr lang="en-US" dirty="0">
                 <a:latin typeface="Avenir" panose="02000503020000020003" pitchFamily="2" charset="0"/>
                 <a:cs typeface="Calibri" panose="020F0502020204030204" pitchFamily="34" charset="0"/>
               </a:endParaRPr>
@@ -7579,7 +7414,7 @@
         <p:spPr>
           <a:xfrm>
             <a:off x="23206191" y="36719826"/>
-            <a:ext cx="6532075" cy="2594906"/>
+            <a:ext cx="6532075" cy="2586674"/>
           </a:xfrm>
           <a:prstGeom prst="rect">
             <a:avLst/>
@@ -8222,41 +8057,8 @@
           </a:prstGeom>
         </p:spPr>
       </p:pic>
-      <p:pic>
-        <p:nvPicPr>
-          <p:cNvPr id="122" name="dc_stages_4.pdf" descr="dc_stages_4.pdf">
-            <a:extLst>
-              <a:ext uri="{FF2B5EF4-FFF2-40B4-BE49-F238E27FC236}">
-                <a16:creationId xmlns:a16="http://schemas.microsoft.com/office/drawing/2014/main" id="{4E426323-DDAC-3FC4-C1ED-2E13B26D278E}"/>
-              </a:ext>
-            </a:extLst>
-          </p:cNvPr>
-          <p:cNvPicPr>
-            <a:picLocks noChangeAspect="1"/>
-          </p:cNvPicPr>
-          <p:nvPr/>
-        </p:nvPicPr>
-        <p:blipFill>
-          <a:blip r:embed="rId9"/>
-          <a:stretch>
-            <a:fillRect/>
-          </a:stretch>
-        </p:blipFill>
-        <p:spPr>
-          <a:xfrm>
-            <a:off x="26340716" y="262549"/>
-            <a:ext cx="3643181" cy="3533886"/>
-          </a:xfrm>
-          <a:prstGeom prst="rect">
-            <a:avLst/>
-          </a:prstGeom>
-          <a:ln w="12700">
-            <a:miter lim="400000"/>
-          </a:ln>
-        </p:spPr>
-      </p:pic>
-      <mc:AlternateContent xmlns:mc="http://schemas.openxmlformats.org/markup-compatibility/2006">
-        <mc:Choice xmlns:a14="http://schemas.microsoft.com/office/drawing/2010/main" Requires="a14">
+      <mc:AlternateContent xmlns:mc="http://schemas.openxmlformats.org/markup-compatibility/2006" xmlns:a14="http://schemas.microsoft.com/office/drawing/2010/main">
+        <mc:Choice Requires="a14">
           <p:sp>
             <p:nvSpPr>
               <p:cNvPr id="124" name="Rectangle 123">
@@ -8372,7 +8174,7 @@
             </p:txBody>
           </p:sp>
         </mc:Choice>
-        <mc:Fallback>
+        <mc:Fallback xmlns="">
           <p:sp>
             <p:nvSpPr>
               <p:cNvPr id="124" name="Rectangle 123">
@@ -8791,6 +8593,165 @@
           </a:p>
         </p:txBody>
       </p:sp>
+      <p:grpSp>
+        <p:nvGrpSpPr>
+          <p:cNvPr id="8" name="Group 7">
+            <a:extLst>
+              <a:ext uri="{FF2B5EF4-FFF2-40B4-BE49-F238E27FC236}">
+                <a16:creationId xmlns:a16="http://schemas.microsoft.com/office/drawing/2014/main" id="{CAC65CCC-2E5C-CA0F-0136-C752A013C080}"/>
+              </a:ext>
+            </a:extLst>
+          </p:cNvPr>
+          <p:cNvGrpSpPr/>
+          <p:nvPr/>
+        </p:nvGrpSpPr>
+        <p:grpSpPr>
+          <a:xfrm>
+            <a:off x="171000" y="490103"/>
+            <a:ext cx="4343401" cy="3578267"/>
+            <a:chOff x="196851" y="57676"/>
+            <a:chExt cx="4343401" cy="3578267"/>
+          </a:xfrm>
+        </p:grpSpPr>
+        <p:pic>
+          <p:nvPicPr>
+            <p:cNvPr id="9" name="Picture 3">
+              <a:extLst>
+                <a:ext uri="{FF2B5EF4-FFF2-40B4-BE49-F238E27FC236}">
+                  <a16:creationId xmlns:a16="http://schemas.microsoft.com/office/drawing/2014/main" id="{F0E8A630-F4A1-CAC7-0768-4D32DBD72EBD}"/>
+                </a:ext>
+              </a:extLst>
+            </p:cNvPr>
+            <p:cNvPicPr>
+              <a:picLocks noChangeAspect="1" noChangeArrowheads="1"/>
+            </p:cNvPicPr>
+            <p:nvPr/>
+          </p:nvPicPr>
+          <p:blipFill rotWithShape="1">
+            <a:blip r:embed="rId29"/>
+            <a:srcRect l="1342" t="2985" r="1115" b="3989"/>
+            <a:stretch/>
+          </p:blipFill>
+          <p:spPr bwMode="auto">
+            <a:xfrm>
+              <a:off x="196852" y="2349500"/>
+              <a:ext cx="4343400" cy="1286443"/>
+            </a:xfrm>
+            <a:prstGeom prst="rect">
+              <a:avLst/>
+            </a:prstGeom>
+            <a:noFill/>
+          </p:spPr>
+        </p:pic>
+        <p:pic>
+          <p:nvPicPr>
+            <p:cNvPr id="10" name="Picture 9">
+              <a:extLst>
+                <a:ext uri="{FF2B5EF4-FFF2-40B4-BE49-F238E27FC236}">
+                  <a16:creationId xmlns:a16="http://schemas.microsoft.com/office/drawing/2014/main" id="{53E99570-4B18-53A0-90BF-4C1E05B71F29}"/>
+                </a:ext>
+              </a:extLst>
+            </p:cNvPr>
+            <p:cNvPicPr>
+              <a:picLocks noChangeAspect="1"/>
+            </p:cNvPicPr>
+            <p:nvPr/>
+          </p:nvPicPr>
+          <p:blipFill>
+            <a:blip r:embed="rId30">
+              <a:extLst>
+                <a:ext uri="{28A0092B-C50C-407E-A947-70E740481C1C}">
+                  <a14:useLocalDpi xmlns:a14="http://schemas.microsoft.com/office/drawing/2010/main" val="0"/>
+                </a:ext>
+              </a:extLst>
+            </a:blip>
+            <a:stretch>
+              <a:fillRect/>
+            </a:stretch>
+          </p:blipFill>
+          <p:spPr>
+            <a:xfrm>
+              <a:off x="196851" y="57676"/>
+              <a:ext cx="4343400" cy="2322730"/>
+            </a:xfrm>
+            <a:prstGeom prst="rect">
+              <a:avLst/>
+            </a:prstGeom>
+          </p:spPr>
+        </p:pic>
+      </p:grpSp>
+      <p:pic>
+        <p:nvPicPr>
+          <p:cNvPr id="13" name="Picture 12" descr="A black and red text&#10;&#10;Description automatically generated">
+            <a:extLst>
+              <a:ext uri="{FF2B5EF4-FFF2-40B4-BE49-F238E27FC236}">
+                <a16:creationId xmlns:a16="http://schemas.microsoft.com/office/drawing/2014/main" id="{D8F70E48-CE7B-2FBE-1395-7E92C6CF88CD}"/>
+              </a:ext>
+            </a:extLst>
+          </p:cNvPr>
+          <p:cNvPicPr>
+            <a:picLocks noChangeAspect="1"/>
+          </p:cNvPicPr>
+          <p:nvPr/>
+        </p:nvPicPr>
+        <p:blipFill>
+          <a:blip r:embed="rId31">
+            <a:extLst>
+              <a:ext uri="{28A0092B-C50C-407E-A947-70E740481C1C}">
+                <a14:useLocalDpi xmlns:a14="http://schemas.microsoft.com/office/drawing/2010/main" val="0"/>
+              </a:ext>
+            </a:extLst>
+          </a:blip>
+          <a:stretch>
+            <a:fillRect/>
+          </a:stretch>
+        </p:blipFill>
+        <p:spPr>
+          <a:xfrm>
+            <a:off x="4997450" y="1050975"/>
+            <a:ext cx="3065098" cy="2372979"/>
+          </a:xfrm>
+          <a:prstGeom prst="rect">
+            <a:avLst/>
+          </a:prstGeom>
+        </p:spPr>
+      </p:pic>
+      <p:pic>
+        <p:nvPicPr>
+          <p:cNvPr id="16" name="Picture 15" descr="A blue and white logo&#10;&#10;Description automatically generated">
+            <a:extLst>
+              <a:ext uri="{FF2B5EF4-FFF2-40B4-BE49-F238E27FC236}">
+                <a16:creationId xmlns:a16="http://schemas.microsoft.com/office/drawing/2014/main" id="{B3AAB93F-FB3F-C3E6-A31B-240977F37851}"/>
+              </a:ext>
+            </a:extLst>
+          </p:cNvPr>
+          <p:cNvPicPr>
+            <a:picLocks noChangeAspect="1"/>
+          </p:cNvPicPr>
+          <p:nvPr/>
+        </p:nvPicPr>
+        <p:blipFill>
+          <a:blip r:embed="rId32">
+            <a:extLst>
+              <a:ext uri="{28A0092B-C50C-407E-A947-70E740481C1C}">
+                <a14:useLocalDpi xmlns:a14="http://schemas.microsoft.com/office/drawing/2010/main" val="0"/>
+              </a:ext>
+            </a:extLst>
+          </a:blip>
+          <a:stretch>
+            <a:fillRect/>
+          </a:stretch>
+        </p:blipFill>
+        <p:spPr>
+          <a:xfrm>
+            <a:off x="26444795" y="639407"/>
+            <a:ext cx="3263900" cy="3060700"/>
+          </a:xfrm>
+          <a:prstGeom prst="rect">
+            <a:avLst/>
+          </a:prstGeom>
+        </p:spPr>
+      </p:pic>
     </p:spTree>
   </p:cSld>
   <p:clrMapOvr>

</xml_diff>